<commit_message>
Changes to be committed: 	modified:   .gitignore 	modified:   .gitignore~ 	new file:   TeX_ML/ei_ml/Figures/bc.png 	modified:   TeX_ML/ei_ml/Figures/bc.pptx 	new file:   TeX_ML/ei_ml/Figures/typical_cnn.png 	new file:   TeX_ML/ei_ml/ei_ml.out 	modified:   TeX_ML/ei_ml/ei_ml.tex 	modified:   TeX_ML/ei_ml/eibib.bib
</commit_message>
<xml_diff>
--- a/TeX_ML/ei_ml/Figures/bc.pptx
+++ b/TeX_ML/ei_ml/Figures/bc.pptx
@@ -104,6 +104,11 @@
       </a:defRPr>
     </a:lvl9pPr>
   </p:defaultTextStyle>
+  <p:extLst>
+    <p:ext uri="{EFAFB233-063F-42B5-8137-9DF3F51BA10A}">
+      <p15:sldGuideLst xmlns:p15="http://schemas.microsoft.com/office/powerpoint/2012/main"/>
+    </p:ext>
+  </p:extLst>
 </p:presentation>
 </file>
 
@@ -238,7 +243,7 @@
           <a:p>
             <a:fld id="{FF22ABF0-7997-4A25-B3B2-872920C59F2F}" type="datetimeFigureOut">
               <a:rPr lang="en-US" smtClean="0"/>
-              <a:t>2/19/2021</a:t>
+              <a:t>2/20/2021</a:t>
             </a:fld>
             <a:endParaRPr lang="en-US"/>
           </a:p>
@@ -408,7 +413,7 @@
           <a:p>
             <a:fld id="{FF22ABF0-7997-4A25-B3B2-872920C59F2F}" type="datetimeFigureOut">
               <a:rPr lang="en-US" smtClean="0"/>
-              <a:t>2/19/2021</a:t>
+              <a:t>2/20/2021</a:t>
             </a:fld>
             <a:endParaRPr lang="en-US"/>
           </a:p>
@@ -588,7 +593,7 @@
           <a:p>
             <a:fld id="{FF22ABF0-7997-4A25-B3B2-872920C59F2F}" type="datetimeFigureOut">
               <a:rPr lang="en-US" smtClean="0"/>
-              <a:t>2/19/2021</a:t>
+              <a:t>2/20/2021</a:t>
             </a:fld>
             <a:endParaRPr lang="en-US"/>
           </a:p>
@@ -758,7 +763,7 @@
           <a:p>
             <a:fld id="{FF22ABF0-7997-4A25-B3B2-872920C59F2F}" type="datetimeFigureOut">
               <a:rPr lang="en-US" smtClean="0"/>
-              <a:t>2/19/2021</a:t>
+              <a:t>2/20/2021</a:t>
             </a:fld>
             <a:endParaRPr lang="en-US"/>
           </a:p>
@@ -1004,7 +1009,7 @@
           <a:p>
             <a:fld id="{FF22ABF0-7997-4A25-B3B2-872920C59F2F}" type="datetimeFigureOut">
               <a:rPr lang="en-US" smtClean="0"/>
-              <a:t>2/19/2021</a:t>
+              <a:t>2/20/2021</a:t>
             </a:fld>
             <a:endParaRPr lang="en-US"/>
           </a:p>
@@ -1236,7 +1241,7 @@
           <a:p>
             <a:fld id="{FF22ABF0-7997-4A25-B3B2-872920C59F2F}" type="datetimeFigureOut">
               <a:rPr lang="en-US" smtClean="0"/>
-              <a:t>2/19/2021</a:t>
+              <a:t>2/20/2021</a:t>
             </a:fld>
             <a:endParaRPr lang="en-US"/>
           </a:p>
@@ -1603,7 +1608,7 @@
           <a:p>
             <a:fld id="{FF22ABF0-7997-4A25-B3B2-872920C59F2F}" type="datetimeFigureOut">
               <a:rPr lang="en-US" smtClean="0"/>
-              <a:t>2/19/2021</a:t>
+              <a:t>2/20/2021</a:t>
             </a:fld>
             <a:endParaRPr lang="en-US"/>
           </a:p>
@@ -1721,7 +1726,7 @@
           <a:p>
             <a:fld id="{FF22ABF0-7997-4A25-B3B2-872920C59F2F}" type="datetimeFigureOut">
               <a:rPr lang="en-US" smtClean="0"/>
-              <a:t>2/19/2021</a:t>
+              <a:t>2/20/2021</a:t>
             </a:fld>
             <a:endParaRPr lang="en-US"/>
           </a:p>
@@ -1816,7 +1821,7 @@
           <a:p>
             <a:fld id="{FF22ABF0-7997-4A25-B3B2-872920C59F2F}" type="datetimeFigureOut">
               <a:rPr lang="en-US" smtClean="0"/>
-              <a:t>2/19/2021</a:t>
+              <a:t>2/20/2021</a:t>
             </a:fld>
             <a:endParaRPr lang="en-US"/>
           </a:p>
@@ -2093,7 +2098,7 @@
           <a:p>
             <a:fld id="{FF22ABF0-7997-4A25-B3B2-872920C59F2F}" type="datetimeFigureOut">
               <a:rPr lang="en-US" smtClean="0"/>
-              <a:t>2/19/2021</a:t>
+              <a:t>2/20/2021</a:t>
             </a:fld>
             <a:endParaRPr lang="en-US"/>
           </a:p>
@@ -2346,7 +2351,7 @@
           <a:p>
             <a:fld id="{FF22ABF0-7997-4A25-B3B2-872920C59F2F}" type="datetimeFigureOut">
               <a:rPr lang="en-US" smtClean="0"/>
-              <a:t>2/19/2021</a:t>
+              <a:t>2/20/2021</a:t>
             </a:fld>
             <a:endParaRPr lang="en-US"/>
           </a:p>
@@ -2559,7 +2564,7 @@
           <a:p>
             <a:fld id="{FF22ABF0-7997-4A25-B3B2-872920C59F2F}" type="datetimeFigureOut">
               <a:rPr lang="en-US" smtClean="0"/>
-              <a:t>2/19/2021</a:t>
+              <a:t>2/20/2021</a:t>
             </a:fld>
             <a:endParaRPr lang="en-US"/>
           </a:p>
@@ -3682,13 +3687,890 @@
         </p:nvCxnSpPr>
         <p:spPr>
           <a:xfrm>
-            <a:off x="4317714" y="682171"/>
+            <a:off x="5098627" y="682171"/>
             <a:ext cx="0" cy="609600"/>
           </a:xfrm>
           <a:prstGeom prst="straightConnector1">
             <a:avLst/>
           </a:prstGeom>
+          <a:ln w="50800">
+            <a:solidFill>
+              <a:schemeClr val="tx1"/>
+            </a:solidFill>
+            <a:tailEnd type="triangle"/>
+          </a:ln>
+        </p:spPr>
+        <p:style>
+          <a:lnRef idx="1">
+            <a:schemeClr val="accent1"/>
+          </a:lnRef>
+          <a:fillRef idx="0">
+            <a:schemeClr val="accent1"/>
+          </a:fillRef>
+          <a:effectRef idx="0">
+            <a:schemeClr val="accent1"/>
+          </a:effectRef>
+          <a:fontRef idx="minor">
+            <a:schemeClr val="tx1"/>
+          </a:fontRef>
+        </p:style>
+      </p:cxnSp>
+      <p:cxnSp>
+        <p:nvCxnSpPr>
+          <p:cNvPr id="30" name="Straight Arrow Connector 29"/>
+          <p:cNvCxnSpPr/>
+          <p:nvPr/>
+        </p:nvCxnSpPr>
+        <p:spPr>
+          <a:xfrm>
+            <a:off x="4328914" y="682171"/>
+            <a:ext cx="0" cy="609600"/>
+          </a:xfrm>
+          <a:prstGeom prst="straightConnector1">
+            <a:avLst/>
+          </a:prstGeom>
+          <a:ln w="50800">
+            <a:solidFill>
+              <a:schemeClr val="tx1"/>
+            </a:solidFill>
+            <a:tailEnd type="triangle"/>
+          </a:ln>
+        </p:spPr>
+        <p:style>
+          <a:lnRef idx="1">
+            <a:schemeClr val="accent1"/>
+          </a:lnRef>
+          <a:fillRef idx="0">
+            <a:schemeClr val="accent1"/>
+          </a:fillRef>
+          <a:effectRef idx="0">
+            <a:schemeClr val="accent1"/>
+          </a:effectRef>
+          <a:fontRef idx="minor">
+            <a:schemeClr val="tx1"/>
+          </a:fontRef>
+        </p:style>
+      </p:cxnSp>
+      <p:cxnSp>
+        <p:nvCxnSpPr>
+          <p:cNvPr id="33" name="Straight Arrow Connector 32"/>
+          <p:cNvCxnSpPr/>
+          <p:nvPr/>
+        </p:nvCxnSpPr>
+        <p:spPr>
+          <a:xfrm>
+            <a:off x="6660139" y="682171"/>
+            <a:ext cx="0" cy="609600"/>
+          </a:xfrm>
+          <a:prstGeom prst="straightConnector1">
+            <a:avLst/>
+          </a:prstGeom>
+          <a:ln w="50800">
+            <a:solidFill>
+              <a:schemeClr val="tx1"/>
+            </a:solidFill>
+            <a:tailEnd type="triangle"/>
+          </a:ln>
+        </p:spPr>
+        <p:style>
+          <a:lnRef idx="1">
+            <a:schemeClr val="accent1"/>
+          </a:lnRef>
+          <a:fillRef idx="0">
+            <a:schemeClr val="accent1"/>
+          </a:fillRef>
+          <a:effectRef idx="0">
+            <a:schemeClr val="accent1"/>
+          </a:effectRef>
+          <a:fontRef idx="minor">
+            <a:schemeClr val="tx1"/>
+          </a:fontRef>
+        </p:style>
+      </p:cxnSp>
+      <p:cxnSp>
+        <p:nvCxnSpPr>
+          <p:cNvPr id="35" name="Straight Arrow Connector 34"/>
+          <p:cNvCxnSpPr/>
+          <p:nvPr/>
+        </p:nvCxnSpPr>
+        <p:spPr>
+          <a:xfrm>
+            <a:off x="5886417" y="682171"/>
+            <a:ext cx="0" cy="609600"/>
+          </a:xfrm>
+          <a:prstGeom prst="straightConnector1">
+            <a:avLst/>
+          </a:prstGeom>
+          <a:ln w="50800">
+            <a:solidFill>
+              <a:schemeClr val="tx1"/>
+            </a:solidFill>
+            <a:tailEnd type="triangle"/>
+          </a:ln>
+        </p:spPr>
+        <p:style>
+          <a:lnRef idx="1">
+            <a:schemeClr val="accent1"/>
+          </a:lnRef>
+          <a:fillRef idx="0">
+            <a:schemeClr val="accent1"/>
+          </a:fillRef>
+          <a:effectRef idx="0">
+            <a:schemeClr val="accent1"/>
+          </a:effectRef>
+          <a:fontRef idx="minor">
+            <a:schemeClr val="tx1"/>
+          </a:fontRef>
+        </p:style>
+      </p:cxnSp>
+      <p:cxnSp>
+        <p:nvCxnSpPr>
+          <p:cNvPr id="36" name="Straight Arrow Connector 35"/>
+          <p:cNvCxnSpPr>
+            <a:stCxn id="46" idx="1"/>
+          </p:cNvCxnSpPr>
+          <p:nvPr/>
+        </p:nvCxnSpPr>
+        <p:spPr>
+          <a:xfrm flipH="1" flipV="1">
+            <a:off x="7538693" y="4454594"/>
+            <a:ext cx="785870" cy="1"/>
+          </a:xfrm>
+          <a:prstGeom prst="straightConnector1">
+            <a:avLst/>
+          </a:prstGeom>
+          <a:ln w="50800">
+            <a:solidFill>
+              <a:schemeClr val="tx1"/>
+            </a:solidFill>
+            <a:tailEnd type="triangle"/>
+          </a:ln>
+        </p:spPr>
+        <p:style>
+          <a:lnRef idx="1">
+            <a:schemeClr val="accent1"/>
+          </a:lnRef>
+          <a:fillRef idx="0">
+            <a:schemeClr val="accent1"/>
+          </a:fillRef>
+          <a:effectRef idx="0">
+            <a:schemeClr val="accent1"/>
+          </a:effectRef>
+          <a:fontRef idx="minor">
+            <a:schemeClr val="tx1"/>
+          </a:fontRef>
+        </p:style>
+      </p:cxnSp>
+      <p:cxnSp>
+        <p:nvCxnSpPr>
+          <p:cNvPr id="37" name="Straight Arrow Connector 36"/>
+          <p:cNvCxnSpPr/>
+          <p:nvPr/>
+        </p:nvCxnSpPr>
+        <p:spPr>
+          <a:xfrm>
+            <a:off x="5464387" y="682171"/>
+            <a:ext cx="0" cy="609600"/>
+          </a:xfrm>
+          <a:prstGeom prst="straightConnector1">
+            <a:avLst/>
+          </a:prstGeom>
+          <a:ln w="50800">
+            <a:solidFill>
+              <a:schemeClr val="tx1"/>
+            </a:solidFill>
+            <a:tailEnd type="triangle"/>
+          </a:ln>
+        </p:spPr>
+        <p:style>
+          <a:lnRef idx="1">
+            <a:schemeClr val="accent1"/>
+          </a:lnRef>
+          <a:fillRef idx="0">
+            <a:schemeClr val="accent1"/>
+          </a:fillRef>
+          <a:effectRef idx="0">
+            <a:schemeClr val="accent1"/>
+          </a:effectRef>
+          <a:fontRef idx="minor">
+            <a:schemeClr val="tx1"/>
+          </a:fontRef>
+        </p:style>
+      </p:cxnSp>
+      <p:cxnSp>
+        <p:nvCxnSpPr>
+          <p:cNvPr id="38" name="Straight Arrow Connector 37"/>
+          <p:cNvCxnSpPr/>
+          <p:nvPr/>
+        </p:nvCxnSpPr>
+        <p:spPr>
+          <a:xfrm>
+            <a:off x="4720525" y="682171"/>
+            <a:ext cx="0" cy="609600"/>
+          </a:xfrm>
+          <a:prstGeom prst="straightConnector1">
+            <a:avLst/>
+          </a:prstGeom>
+          <a:ln w="50800">
+            <a:solidFill>
+              <a:schemeClr val="tx1"/>
+            </a:solidFill>
+            <a:tailEnd type="triangle"/>
+          </a:ln>
+        </p:spPr>
+        <p:style>
+          <a:lnRef idx="1">
+            <a:schemeClr val="accent1"/>
+          </a:lnRef>
+          <a:fillRef idx="0">
+            <a:schemeClr val="accent1"/>
+          </a:fillRef>
+          <a:effectRef idx="0">
+            <a:schemeClr val="accent1"/>
+          </a:effectRef>
+          <a:fontRef idx="minor">
+            <a:schemeClr val="tx1"/>
+          </a:fontRef>
+        </p:style>
+      </p:cxnSp>
+      <p:cxnSp>
+        <p:nvCxnSpPr>
+          <p:cNvPr id="41" name="Straight Arrow Connector 40"/>
+          <p:cNvCxnSpPr/>
+          <p:nvPr/>
+        </p:nvCxnSpPr>
+        <p:spPr>
+          <a:xfrm>
+            <a:off x="6252176" y="682171"/>
+            <a:ext cx="0" cy="609600"/>
+          </a:xfrm>
+          <a:prstGeom prst="straightConnector1">
+            <a:avLst/>
+          </a:prstGeom>
+          <a:ln w="50800">
+            <a:solidFill>
+              <a:schemeClr val="tx1"/>
+            </a:solidFill>
+            <a:tailEnd type="triangle"/>
+          </a:ln>
+        </p:spPr>
+        <p:style>
+          <a:lnRef idx="1">
+            <a:schemeClr val="accent1"/>
+          </a:lnRef>
+          <a:fillRef idx="0">
+            <a:schemeClr val="accent1"/>
+          </a:fillRef>
+          <a:effectRef idx="0">
+            <a:schemeClr val="accent1"/>
+          </a:effectRef>
+          <a:fontRef idx="minor">
+            <a:schemeClr val="tx1"/>
+          </a:fontRef>
+        </p:style>
+      </p:cxnSp>
+      <p:cxnSp>
+        <p:nvCxnSpPr>
+          <p:cNvPr id="42" name="Straight Arrow Connector 41"/>
+          <p:cNvCxnSpPr/>
+          <p:nvPr/>
+        </p:nvCxnSpPr>
+        <p:spPr>
+          <a:xfrm>
+            <a:off x="7073227" y="682171"/>
+            <a:ext cx="0" cy="609600"/>
+          </a:xfrm>
+          <a:prstGeom prst="straightConnector1">
+            <a:avLst/>
+          </a:prstGeom>
+          <a:ln w="50800">
+            <a:solidFill>
+              <a:schemeClr val="tx1"/>
+            </a:solidFill>
+            <a:tailEnd type="triangle"/>
+          </a:ln>
+        </p:spPr>
+        <p:style>
+          <a:lnRef idx="1">
+            <a:schemeClr val="accent1"/>
+          </a:lnRef>
+          <a:fillRef idx="0">
+            <a:schemeClr val="accent1"/>
+          </a:fillRef>
+          <a:effectRef idx="0">
+            <a:schemeClr val="accent1"/>
+          </a:effectRef>
+          <a:fontRef idx="minor">
+            <a:schemeClr val="tx1"/>
+          </a:fontRef>
+        </p:style>
+      </p:cxnSp>
+      <p:sp>
+        <p:nvSpPr>
+          <p:cNvPr id="2" name="Oval 1"/>
+          <p:cNvSpPr/>
+          <p:nvPr/>
+        </p:nvSpPr>
+        <p:spPr>
+          <a:xfrm>
+            <a:off x="5098627" y="3840480"/>
+            <a:ext cx="787790" cy="829994"/>
+          </a:xfrm>
+          <a:prstGeom prst="ellipse">
+            <a:avLst/>
+          </a:prstGeom>
+          <a:pattFill prst="pct75">
+            <a:fgClr>
+              <a:schemeClr val="tx1"/>
+            </a:fgClr>
+            <a:bgClr>
+              <a:schemeClr val="bg1"/>
+            </a:bgClr>
+          </a:pattFill>
           <a:ln>
+            <a:solidFill>
+              <a:schemeClr val="tx1"/>
+            </a:solidFill>
+          </a:ln>
+        </p:spPr>
+        <p:style>
+          <a:lnRef idx="2">
+            <a:schemeClr val="accent1">
+              <a:shade val="50000"/>
+            </a:schemeClr>
+          </a:lnRef>
+          <a:fillRef idx="1">
+            <a:schemeClr val="accent1"/>
+          </a:fillRef>
+          <a:effectRef idx="0">
+            <a:schemeClr val="accent1"/>
+          </a:effectRef>
+          <a:fontRef idx="minor">
+            <a:schemeClr val="lt1"/>
+          </a:fontRef>
+        </p:style>
+        <p:txBody>
+          <a:bodyPr rtlCol="0" anchor="ctr"/>
+          <a:lstStyle/>
+          <a:p>
+            <a:pPr algn="ctr"/>
+            <a:endParaRPr lang="en-US"/>
+          </a:p>
+        </p:txBody>
+      </p:sp>
+      <p:sp>
+        <p:nvSpPr>
+          <p:cNvPr id="44" name="TextBox 43"/>
+          <p:cNvSpPr txBox="1"/>
+          <p:nvPr/>
+        </p:nvSpPr>
+        <p:spPr>
+          <a:xfrm>
+            <a:off x="5042683" y="192705"/>
+            <a:ext cx="1800665" cy="369332"/>
+          </a:xfrm>
+          <a:prstGeom prst="rect">
+            <a:avLst/>
+          </a:prstGeom>
+          <a:noFill/>
+          <a:ln w="25400">
+            <a:solidFill>
+              <a:schemeClr val="tx1"/>
+            </a:solidFill>
+          </a:ln>
+        </p:spPr>
+        <p:txBody>
+          <a:bodyPr wrap="square" rtlCol="0">
+            <a:spAutoFit/>
+          </a:bodyPr>
+          <a:lstStyle/>
+          <a:p>
+            <a:r>
+              <a:rPr lang="en-US" dirty="0" smtClean="0"/>
+              <a:t>Downward force</a:t>
+            </a:r>
+            <a:endParaRPr lang="en-US" dirty="0"/>
+          </a:p>
+        </p:txBody>
+      </p:sp>
+      <p:sp>
+        <p:nvSpPr>
+          <p:cNvPr id="45" name="TextBox 44"/>
+          <p:cNvSpPr txBox="1"/>
+          <p:nvPr/>
+        </p:nvSpPr>
+        <p:spPr>
+          <a:xfrm>
+            <a:off x="1589139" y="3669764"/>
+            <a:ext cx="1970059" cy="1200329"/>
+          </a:xfrm>
+          <a:prstGeom prst="rect">
+            <a:avLst/>
+          </a:prstGeom>
+          <a:noFill/>
+          <a:ln w="25400">
+            <a:solidFill>
+              <a:schemeClr val="tx1"/>
+            </a:solidFill>
+          </a:ln>
+        </p:spPr>
+        <p:txBody>
+          <a:bodyPr wrap="square" rtlCol="0">
+            <a:spAutoFit/>
+          </a:bodyPr>
+          <a:lstStyle/>
+          <a:p>
+            <a:r>
+              <a:rPr lang="en-US" dirty="0" smtClean="0"/>
+              <a:t>Circular inclusion of elevated, constant shear modulus</a:t>
+            </a:r>
+            <a:endParaRPr lang="en-US" dirty="0"/>
+          </a:p>
+        </p:txBody>
+      </p:sp>
+      <p:sp>
+        <p:nvSpPr>
+          <p:cNvPr id="46" name="TextBox 45"/>
+          <p:cNvSpPr txBox="1"/>
+          <p:nvPr/>
+        </p:nvSpPr>
+        <p:spPr>
+          <a:xfrm>
+            <a:off x="8324563" y="4269929"/>
+            <a:ext cx="1800665" cy="369332"/>
+          </a:xfrm>
+          <a:prstGeom prst="rect">
+            <a:avLst/>
+          </a:prstGeom>
+          <a:noFill/>
+          <a:ln w="25400">
+            <a:solidFill>
+              <a:schemeClr val="tx1"/>
+            </a:solidFill>
+          </a:ln>
+        </p:spPr>
+        <p:txBody>
+          <a:bodyPr wrap="square" rtlCol="0">
+            <a:spAutoFit/>
+          </a:bodyPr>
+          <a:lstStyle/>
+          <a:p>
+            <a:r>
+              <a:rPr lang="en-US" dirty="0" smtClean="0"/>
+              <a:t>Traction free side</a:t>
+            </a:r>
+            <a:endParaRPr lang="en-US" dirty="0"/>
+          </a:p>
+        </p:txBody>
+      </p:sp>
+      <p:cxnSp>
+        <p:nvCxnSpPr>
+          <p:cNvPr id="48" name="Straight Arrow Connector 47"/>
+          <p:cNvCxnSpPr/>
+          <p:nvPr/>
+        </p:nvCxnSpPr>
+        <p:spPr>
+          <a:xfrm>
+            <a:off x="7538693" y="682171"/>
+            <a:ext cx="0" cy="609600"/>
+          </a:xfrm>
+          <a:prstGeom prst="straightConnector1">
+            <a:avLst/>
+          </a:prstGeom>
+          <a:ln w="50800">
+            <a:solidFill>
+              <a:schemeClr val="tx1"/>
+            </a:solidFill>
+            <a:tailEnd type="triangle"/>
+          </a:ln>
+        </p:spPr>
+        <p:style>
+          <a:lnRef idx="1">
+            <a:schemeClr val="accent1"/>
+          </a:lnRef>
+          <a:fillRef idx="0">
+            <a:schemeClr val="accent1"/>
+          </a:fillRef>
+          <a:effectRef idx="0">
+            <a:schemeClr val="accent1"/>
+          </a:effectRef>
+          <a:fontRef idx="minor">
+            <a:schemeClr val="tx1"/>
+          </a:fontRef>
+        </p:style>
+      </p:cxnSp>
+      <p:sp>
+        <p:nvSpPr>
+          <p:cNvPr id="53" name="TextBox 52"/>
+          <p:cNvSpPr txBox="1"/>
+          <p:nvPr/>
+        </p:nvSpPr>
+        <p:spPr>
+          <a:xfrm>
+            <a:off x="1734338" y="2750124"/>
+            <a:ext cx="1800665" cy="369332"/>
+          </a:xfrm>
+          <a:prstGeom prst="rect">
+            <a:avLst/>
+          </a:prstGeom>
+          <a:noFill/>
+          <a:ln w="25400">
+            <a:solidFill>
+              <a:schemeClr val="tx1"/>
+            </a:solidFill>
+          </a:ln>
+        </p:spPr>
+        <p:txBody>
+          <a:bodyPr wrap="square" rtlCol="0">
+            <a:spAutoFit/>
+          </a:bodyPr>
+          <a:lstStyle/>
+          <a:p>
+            <a:r>
+              <a:rPr lang="en-US" dirty="0" smtClean="0"/>
+              <a:t>Traction free side</a:t>
+            </a:r>
+            <a:endParaRPr lang="en-US" dirty="0"/>
+          </a:p>
+        </p:txBody>
+      </p:sp>
+      <p:cxnSp>
+        <p:nvCxnSpPr>
+          <p:cNvPr id="54" name="Straight Arrow Connector 53"/>
+          <p:cNvCxnSpPr/>
+          <p:nvPr/>
+        </p:nvCxnSpPr>
+        <p:spPr>
+          <a:xfrm flipV="1">
+            <a:off x="3526030" y="2934790"/>
+            <a:ext cx="832010" cy="6161"/>
+          </a:xfrm>
+          <a:prstGeom prst="straightConnector1">
+            <a:avLst/>
+          </a:prstGeom>
+          <a:ln w="50800">
+            <a:solidFill>
+              <a:schemeClr val="tx1"/>
+            </a:solidFill>
+            <a:tailEnd type="triangle"/>
+          </a:ln>
+        </p:spPr>
+        <p:style>
+          <a:lnRef idx="1">
+            <a:schemeClr val="accent1"/>
+          </a:lnRef>
+          <a:fillRef idx="0">
+            <a:schemeClr val="accent1"/>
+          </a:fillRef>
+          <a:effectRef idx="0">
+            <a:schemeClr val="accent1"/>
+          </a:effectRef>
+          <a:fontRef idx="minor">
+            <a:schemeClr val="tx1"/>
+          </a:fontRef>
+        </p:style>
+      </p:cxnSp>
+      <p:cxnSp>
+        <p:nvCxnSpPr>
+          <p:cNvPr id="58" name="Straight Arrow Connector 57"/>
+          <p:cNvCxnSpPr/>
+          <p:nvPr/>
+        </p:nvCxnSpPr>
+        <p:spPr>
+          <a:xfrm flipH="1">
+            <a:off x="6642138" y="2399435"/>
+            <a:ext cx="1991491" cy="0"/>
+          </a:xfrm>
+          <a:prstGeom prst="straightConnector1">
+            <a:avLst/>
+          </a:prstGeom>
+          <a:ln w="50800">
+            <a:solidFill>
+              <a:schemeClr val="tx1"/>
+            </a:solidFill>
+            <a:tailEnd type="triangle"/>
+          </a:ln>
+        </p:spPr>
+        <p:style>
+          <a:lnRef idx="1">
+            <a:schemeClr val="accent1"/>
+          </a:lnRef>
+          <a:fillRef idx="0">
+            <a:schemeClr val="accent1"/>
+          </a:fillRef>
+          <a:effectRef idx="0">
+            <a:schemeClr val="accent1"/>
+          </a:effectRef>
+          <a:fontRef idx="minor">
+            <a:schemeClr val="tx1"/>
+          </a:fontRef>
+        </p:style>
+      </p:cxnSp>
+      <p:cxnSp>
+        <p:nvCxnSpPr>
+          <p:cNvPr id="62" name="Straight Arrow Connector 61"/>
+          <p:cNvCxnSpPr>
+            <a:stCxn id="45" idx="3"/>
+            <a:endCxn id="2" idx="2"/>
+          </p:cNvCxnSpPr>
+          <p:nvPr/>
+        </p:nvCxnSpPr>
+        <p:spPr>
+          <a:xfrm flipV="1">
+            <a:off x="3559198" y="4255477"/>
+            <a:ext cx="1539429" cy="14452"/>
+          </a:xfrm>
+          <a:prstGeom prst="straightConnector1">
+            <a:avLst/>
+          </a:prstGeom>
+          <a:ln w="50800">
+            <a:solidFill>
+              <a:schemeClr val="tx1"/>
+            </a:solidFill>
+            <a:tailEnd type="triangle"/>
+          </a:ln>
+        </p:spPr>
+        <p:style>
+          <a:lnRef idx="1">
+            <a:schemeClr val="accent1"/>
+          </a:lnRef>
+          <a:fillRef idx="0">
+            <a:schemeClr val="accent1"/>
+          </a:fillRef>
+          <a:effectRef idx="0">
+            <a:schemeClr val="accent1"/>
+          </a:effectRef>
+          <a:fontRef idx="minor">
+            <a:schemeClr val="tx1"/>
+          </a:fontRef>
+        </p:style>
+      </p:cxnSp>
+      <p:sp>
+        <p:nvSpPr>
+          <p:cNvPr id="69" name="TextBox 68"/>
+          <p:cNvSpPr txBox="1"/>
+          <p:nvPr/>
+        </p:nvSpPr>
+        <p:spPr>
+          <a:xfrm>
+            <a:off x="8651631" y="1937770"/>
+            <a:ext cx="1970059" cy="923330"/>
+          </a:xfrm>
+          <a:prstGeom prst="rect">
+            <a:avLst/>
+          </a:prstGeom>
+          <a:noFill/>
+          <a:ln w="25400">
+            <a:solidFill>
+              <a:schemeClr val="tx1"/>
+            </a:solidFill>
+          </a:ln>
+        </p:spPr>
+        <p:txBody>
+          <a:bodyPr wrap="square" rtlCol="0">
+            <a:spAutoFit/>
+          </a:bodyPr>
+          <a:lstStyle/>
+          <a:p>
+            <a:r>
+              <a:rPr lang="en-US" dirty="0" smtClean="0"/>
+              <a:t>Constant shear modulus in the background </a:t>
+            </a:r>
+            <a:endParaRPr lang="en-US" dirty="0"/>
+          </a:p>
+        </p:txBody>
+      </p:sp>
+      <p:cxnSp>
+        <p:nvCxnSpPr>
+          <p:cNvPr id="70" name="Straight Arrow Connector 69"/>
+          <p:cNvCxnSpPr/>
+          <p:nvPr/>
+        </p:nvCxnSpPr>
+        <p:spPr>
+          <a:xfrm flipH="1">
+            <a:off x="13722632" y="5071019"/>
+            <a:ext cx="1991491" cy="0"/>
+          </a:xfrm>
+          <a:prstGeom prst="straightConnector1">
+            <a:avLst/>
+          </a:prstGeom>
+          <a:ln w="50800">
+            <a:solidFill>
+              <a:schemeClr val="tx1"/>
+            </a:solidFill>
+            <a:tailEnd type="triangle"/>
+          </a:ln>
+        </p:spPr>
+        <p:style>
+          <a:lnRef idx="1">
+            <a:schemeClr val="accent1"/>
+          </a:lnRef>
+          <a:fillRef idx="0">
+            <a:schemeClr val="accent1"/>
+          </a:fillRef>
+          <a:effectRef idx="0">
+            <a:schemeClr val="accent1"/>
+          </a:effectRef>
+          <a:fontRef idx="minor">
+            <a:schemeClr val="tx1"/>
+          </a:fontRef>
+        </p:style>
+      </p:cxnSp>
+      <p:cxnSp>
+        <p:nvCxnSpPr>
+          <p:cNvPr id="71" name="Straight Arrow Connector 70"/>
+          <p:cNvCxnSpPr/>
+          <p:nvPr/>
+        </p:nvCxnSpPr>
+        <p:spPr>
+          <a:xfrm flipV="1">
+            <a:off x="1473173" y="5202211"/>
+            <a:ext cx="0" cy="1064359"/>
+          </a:xfrm>
+          <a:prstGeom prst="straightConnector1">
+            <a:avLst/>
+          </a:prstGeom>
+          <a:ln w="50800">
+            <a:solidFill>
+              <a:schemeClr val="tx1"/>
+            </a:solidFill>
+            <a:tailEnd type="triangle"/>
+          </a:ln>
+        </p:spPr>
+        <p:style>
+          <a:lnRef idx="1">
+            <a:schemeClr val="accent1"/>
+          </a:lnRef>
+          <a:fillRef idx="0">
+            <a:schemeClr val="accent1"/>
+          </a:fillRef>
+          <a:effectRef idx="0">
+            <a:schemeClr val="accent1"/>
+          </a:effectRef>
+          <a:fontRef idx="minor">
+            <a:schemeClr val="tx1"/>
+          </a:fontRef>
+        </p:style>
+      </p:cxnSp>
+      <p:cxnSp>
+        <p:nvCxnSpPr>
+          <p:cNvPr id="73" name="Straight Arrow Connector 72"/>
+          <p:cNvCxnSpPr/>
+          <p:nvPr/>
+        </p:nvCxnSpPr>
+        <p:spPr>
+          <a:xfrm>
+            <a:off x="1472574" y="6266570"/>
+            <a:ext cx="1101594" cy="0"/>
+          </a:xfrm>
+          <a:prstGeom prst="straightConnector1">
+            <a:avLst/>
+          </a:prstGeom>
+          <a:ln w="50800">
+            <a:solidFill>
+              <a:schemeClr val="tx1"/>
+            </a:solidFill>
+            <a:tailEnd type="triangle"/>
+          </a:ln>
+        </p:spPr>
+        <p:style>
+          <a:lnRef idx="1">
+            <a:schemeClr val="accent1"/>
+          </a:lnRef>
+          <a:fillRef idx="0">
+            <a:schemeClr val="accent1"/>
+          </a:fillRef>
+          <a:effectRef idx="0">
+            <a:schemeClr val="accent1"/>
+          </a:effectRef>
+          <a:fontRef idx="minor">
+            <a:schemeClr val="tx1"/>
+          </a:fontRef>
+        </p:style>
+      </p:cxnSp>
+      <p:sp>
+        <p:nvSpPr>
+          <p:cNvPr id="79" name="TextBox 78"/>
+          <p:cNvSpPr txBox="1"/>
+          <p:nvPr/>
+        </p:nvSpPr>
+        <p:spPr>
+          <a:xfrm>
+            <a:off x="2616711" y="6081904"/>
+            <a:ext cx="378070" cy="369332"/>
+          </a:xfrm>
+          <a:prstGeom prst="rect">
+            <a:avLst/>
+          </a:prstGeom>
+          <a:noFill/>
+          <a:ln w="25400">
+            <a:noFill/>
+          </a:ln>
+        </p:spPr>
+        <p:txBody>
+          <a:bodyPr wrap="square" rtlCol="0">
+            <a:spAutoFit/>
+          </a:bodyPr>
+          <a:lstStyle/>
+          <a:p>
+            <a:r>
+              <a:rPr lang="en-US" dirty="0" smtClean="0"/>
+              <a:t>X</a:t>
+            </a:r>
+            <a:endParaRPr lang="en-US" dirty="0"/>
+          </a:p>
+        </p:txBody>
+      </p:sp>
+      <p:sp>
+        <p:nvSpPr>
+          <p:cNvPr id="80" name="TextBox 79"/>
+          <p:cNvSpPr txBox="1"/>
+          <p:nvPr/>
+        </p:nvSpPr>
+        <p:spPr>
+          <a:xfrm>
+            <a:off x="1589139" y="5132139"/>
+            <a:ext cx="378070" cy="369332"/>
+          </a:xfrm>
+          <a:prstGeom prst="rect">
+            <a:avLst/>
+          </a:prstGeom>
+          <a:noFill/>
+          <a:ln w="25400">
+            <a:noFill/>
+          </a:ln>
+        </p:spPr>
+        <p:txBody>
+          <a:bodyPr wrap="square" rtlCol="0">
+            <a:spAutoFit/>
+          </a:bodyPr>
+          <a:lstStyle/>
+          <a:p>
+            <a:r>
+              <a:rPr lang="en-US" dirty="0"/>
+              <a:t>Y</a:t>
+            </a:r>
+          </a:p>
+        </p:txBody>
+      </p:sp>
+      <p:cxnSp>
+        <p:nvCxnSpPr>
+          <p:cNvPr id="50" name="Straight Arrow Connector 49"/>
+          <p:cNvCxnSpPr/>
+          <p:nvPr/>
+        </p:nvCxnSpPr>
+        <p:spPr>
+          <a:xfrm flipH="1">
+            <a:off x="6126662" y="4639260"/>
+            <a:ext cx="2197902" cy="1199766"/>
+          </a:xfrm>
+          <a:prstGeom prst="straightConnector1">
+            <a:avLst/>
+          </a:prstGeom>
+          <a:ln w="50800">
+            <a:solidFill>
+              <a:schemeClr val="tx1"/>
+            </a:solidFill>
             <a:tailEnd type="triangle"/>
           </a:ln>
         </p:spPr>

</xml_diff>